<commit_message>
Change of flow chart
</commit_message>
<xml_diff>
--- a/Hidden_files/Tesis/Otros/DiagramaFlujo.pptx
+++ b/Hidden_files/Tesis/Otros/DiagramaFlujo.pptx
@@ -243,7 +243,7 @@
           <a:p>
             <a:fld id="{5F72CBEA-126E-4E35-8122-0478AC9B69BE}" type="datetimeFigureOut">
               <a:rPr lang="fr-FR" smtClean="0"/>
-              <a:t>15/10/2020</a:t>
+              <a:t>20/10/2020</a:t>
             </a:fld>
             <a:endParaRPr lang="fr-FR"/>
           </a:p>
@@ -413,7 +413,7 @@
           <a:p>
             <a:fld id="{5F72CBEA-126E-4E35-8122-0478AC9B69BE}" type="datetimeFigureOut">
               <a:rPr lang="fr-FR" smtClean="0"/>
-              <a:t>15/10/2020</a:t>
+              <a:t>20/10/2020</a:t>
             </a:fld>
             <a:endParaRPr lang="fr-FR"/>
           </a:p>
@@ -593,7 +593,7 @@
           <a:p>
             <a:fld id="{5F72CBEA-126E-4E35-8122-0478AC9B69BE}" type="datetimeFigureOut">
               <a:rPr lang="fr-FR" smtClean="0"/>
-              <a:t>15/10/2020</a:t>
+              <a:t>20/10/2020</a:t>
             </a:fld>
             <a:endParaRPr lang="fr-FR"/>
           </a:p>
@@ -763,7 +763,7 @@
           <a:p>
             <a:fld id="{5F72CBEA-126E-4E35-8122-0478AC9B69BE}" type="datetimeFigureOut">
               <a:rPr lang="fr-FR" smtClean="0"/>
-              <a:t>15/10/2020</a:t>
+              <a:t>20/10/2020</a:t>
             </a:fld>
             <a:endParaRPr lang="fr-FR"/>
           </a:p>
@@ -1009,7 +1009,7 @@
           <a:p>
             <a:fld id="{5F72CBEA-126E-4E35-8122-0478AC9B69BE}" type="datetimeFigureOut">
               <a:rPr lang="fr-FR" smtClean="0"/>
-              <a:t>15/10/2020</a:t>
+              <a:t>20/10/2020</a:t>
             </a:fld>
             <a:endParaRPr lang="fr-FR"/>
           </a:p>
@@ -1241,7 +1241,7 @@
           <a:p>
             <a:fld id="{5F72CBEA-126E-4E35-8122-0478AC9B69BE}" type="datetimeFigureOut">
               <a:rPr lang="fr-FR" smtClean="0"/>
-              <a:t>15/10/2020</a:t>
+              <a:t>20/10/2020</a:t>
             </a:fld>
             <a:endParaRPr lang="fr-FR"/>
           </a:p>
@@ -1608,7 +1608,7 @@
           <a:p>
             <a:fld id="{5F72CBEA-126E-4E35-8122-0478AC9B69BE}" type="datetimeFigureOut">
               <a:rPr lang="fr-FR" smtClean="0"/>
-              <a:t>15/10/2020</a:t>
+              <a:t>20/10/2020</a:t>
             </a:fld>
             <a:endParaRPr lang="fr-FR"/>
           </a:p>
@@ -1726,7 +1726,7 @@
           <a:p>
             <a:fld id="{5F72CBEA-126E-4E35-8122-0478AC9B69BE}" type="datetimeFigureOut">
               <a:rPr lang="fr-FR" smtClean="0"/>
-              <a:t>15/10/2020</a:t>
+              <a:t>20/10/2020</a:t>
             </a:fld>
             <a:endParaRPr lang="fr-FR"/>
           </a:p>
@@ -1821,7 +1821,7 @@
           <a:p>
             <a:fld id="{5F72CBEA-126E-4E35-8122-0478AC9B69BE}" type="datetimeFigureOut">
               <a:rPr lang="fr-FR" smtClean="0"/>
-              <a:t>15/10/2020</a:t>
+              <a:t>20/10/2020</a:t>
             </a:fld>
             <a:endParaRPr lang="fr-FR"/>
           </a:p>
@@ -2098,7 +2098,7 @@
           <a:p>
             <a:fld id="{5F72CBEA-126E-4E35-8122-0478AC9B69BE}" type="datetimeFigureOut">
               <a:rPr lang="fr-FR" smtClean="0"/>
-              <a:t>15/10/2020</a:t>
+              <a:t>20/10/2020</a:t>
             </a:fld>
             <a:endParaRPr lang="fr-FR"/>
           </a:p>
@@ -2351,7 +2351,7 @@
           <a:p>
             <a:fld id="{5F72CBEA-126E-4E35-8122-0478AC9B69BE}" type="datetimeFigureOut">
               <a:rPr lang="fr-FR" smtClean="0"/>
-              <a:t>15/10/2020</a:t>
+              <a:t>20/10/2020</a:t>
             </a:fld>
             <a:endParaRPr lang="fr-FR"/>
           </a:p>
@@ -2564,7 +2564,7 @@
           <a:p>
             <a:fld id="{5F72CBEA-126E-4E35-8122-0478AC9B69BE}" type="datetimeFigureOut">
               <a:rPr lang="fr-FR" smtClean="0"/>
-              <a:t>15/10/2020</a:t>
+              <a:t>20/10/2020</a:t>
             </a:fld>
             <a:endParaRPr lang="fr-FR"/>
           </a:p>
@@ -2977,7 +2977,7 @@
         </p:nvSpPr>
         <p:spPr>
           <a:xfrm>
-            <a:off x="1952895" y="2177"/>
+            <a:off x="0" y="229041"/>
             <a:ext cx="1384663" cy="470261"/>
           </a:xfrm>
           <a:prstGeom prst="ellipse">
@@ -3039,7 +3039,7 @@
         </p:nvSpPr>
         <p:spPr>
           <a:xfrm>
-            <a:off x="1449976" y="799011"/>
+            <a:off x="1785022" y="65755"/>
             <a:ext cx="2390503" cy="796834"/>
           </a:xfrm>
           <a:prstGeom prst="rect">
@@ -3081,7 +3081,20 @@
                 <a:latin typeface="Arial" panose="020B0604020202020204" pitchFamily="34" charset="0"/>
                 <a:cs typeface="Arial" panose="020B0604020202020204" pitchFamily="34" charset="0"/>
               </a:rPr>
-              <a:t>Simular demanda de alumnos para t+1</a:t>
+              <a:t>(1)</a:t>
+            </a:r>
+          </a:p>
+          <a:p>
+            <a:pPr algn="ctr"/>
+            <a:r>
+              <a:rPr lang="es-MX" dirty="0" smtClean="0">
+                <a:solidFill>
+                  <a:schemeClr val="tx1"/>
+                </a:solidFill>
+                <a:latin typeface="Arial" panose="020B0604020202020204" pitchFamily="34" charset="0"/>
+                <a:cs typeface="Arial" panose="020B0604020202020204" pitchFamily="34" charset="0"/>
+              </a:rPr>
+              <a:t>Extracción de datos</a:t>
             </a:r>
             <a:endParaRPr lang="fr-FR" dirty="0" smtClean="0">
               <a:solidFill>
@@ -3093,19 +3106,104 @@
           </a:p>
         </p:txBody>
       </p:sp>
+      <p:sp>
+        <p:nvSpPr>
+          <p:cNvPr id="7" name="Rectángulo 6"/>
+          <p:cNvSpPr/>
+          <p:nvPr/>
+        </p:nvSpPr>
+        <p:spPr>
+          <a:xfrm>
+            <a:off x="1785021" y="3495396"/>
+            <a:ext cx="2390503" cy="796834"/>
+          </a:xfrm>
+          <a:prstGeom prst="rect">
+            <a:avLst/>
+          </a:prstGeom>
+          <a:noFill/>
+          <a:ln>
+            <a:solidFill>
+              <a:schemeClr val="tx1"/>
+            </a:solidFill>
+          </a:ln>
+        </p:spPr>
+        <p:style>
+          <a:lnRef idx="2">
+            <a:schemeClr val="accent1">
+              <a:shade val="50000"/>
+            </a:schemeClr>
+          </a:lnRef>
+          <a:fillRef idx="1">
+            <a:schemeClr val="accent1"/>
+          </a:fillRef>
+          <a:effectRef idx="0">
+            <a:schemeClr val="accent1"/>
+          </a:effectRef>
+          <a:fontRef idx="minor">
+            <a:schemeClr val="lt1"/>
+          </a:fontRef>
+        </p:style>
+        <p:txBody>
+          <a:bodyPr rtlCol="0" anchor="ctr"/>
+          <a:lstStyle/>
+          <a:p>
+            <a:pPr algn="ctr"/>
+            <a:r>
+              <a:rPr lang="es-MX" dirty="0" smtClean="0">
+                <a:solidFill>
+                  <a:schemeClr val="tx1"/>
+                </a:solidFill>
+                <a:latin typeface="Arial" panose="020B0604020202020204" pitchFamily="34" charset="0"/>
+                <a:cs typeface="Arial" panose="020B0604020202020204" pitchFamily="34" charset="0"/>
+              </a:rPr>
+              <a:t>(4)</a:t>
+            </a:r>
+          </a:p>
+          <a:p>
+            <a:pPr algn="ctr"/>
+            <a:r>
+              <a:rPr lang="es-MX" dirty="0" smtClean="0">
+                <a:solidFill>
+                  <a:schemeClr val="tx1"/>
+                </a:solidFill>
+                <a:latin typeface="Arial" panose="020B0604020202020204" pitchFamily="34" charset="0"/>
+                <a:cs typeface="Arial" panose="020B0604020202020204" pitchFamily="34" charset="0"/>
+              </a:rPr>
+              <a:t>Simular </a:t>
+            </a:r>
+            <a:r>
+              <a:rPr lang="es-MX" dirty="0">
+                <a:solidFill>
+                  <a:schemeClr val="tx1"/>
+                </a:solidFill>
+                <a:latin typeface="Arial" panose="020B0604020202020204" pitchFamily="34" charset="0"/>
+                <a:cs typeface="Arial" panose="020B0604020202020204" pitchFamily="34" charset="0"/>
+              </a:rPr>
+              <a:t>esqueletos</a:t>
+            </a:r>
+            <a:endParaRPr lang="fr-FR" dirty="0">
+              <a:solidFill>
+                <a:schemeClr val="tx1"/>
+              </a:solidFill>
+              <a:latin typeface="Arial" panose="020B0604020202020204" pitchFamily="34" charset="0"/>
+              <a:cs typeface="Arial" panose="020B0604020202020204" pitchFamily="34" charset="0"/>
+            </a:endParaRPr>
+          </a:p>
+        </p:txBody>
+      </p:sp>
       <p:cxnSp>
         <p:nvCxnSpPr>
-          <p:cNvPr id="6" name="Conector recto de flecha 5"/>
+          <p:cNvPr id="8" name="Conector recto de flecha 7"/>
           <p:cNvCxnSpPr>
-            <a:stCxn id="4" idx="4"/>
-            <a:endCxn id="5" idx="0"/>
+            <a:stCxn id="5" idx="2"/>
+            <a:endCxn id="33" idx="0"/>
           </p:cNvCxnSpPr>
           <p:nvPr/>
         </p:nvCxnSpPr>
         <p:spPr>
           <a:xfrm>
-            <a:off x="2645227" y="472438"/>
-            <a:ext cx="1" cy="326573"/>
+            <a:off x="2980274" y="862589"/>
+            <a:ext cx="0" cy="301225"/>
           </a:xfrm>
           <a:prstGeom prst="straightConnector1">
             <a:avLst/>
@@ -3134,14 +3232,14 @@
       </p:cxnSp>
       <p:sp>
         <p:nvSpPr>
-          <p:cNvPr id="7" name="Rectángulo 6"/>
+          <p:cNvPr id="9" name="Rectángulo 8"/>
           <p:cNvSpPr/>
           <p:nvPr/>
         </p:nvSpPr>
         <p:spPr>
           <a:xfrm>
-            <a:off x="1449975" y="1946362"/>
-            <a:ext cx="2390503" cy="796834"/>
+            <a:off x="1785020" y="4591593"/>
+            <a:ext cx="2390503" cy="1123407"/>
           </a:xfrm>
           <a:prstGeom prst="rect">
             <a:avLst/>
@@ -3175,6 +3273,29 @@
           <a:p>
             <a:pPr algn="ctr"/>
             <a:r>
+              <a:rPr lang="es-MX" dirty="0" smtClean="0">
+                <a:solidFill>
+                  <a:schemeClr val="tx1"/>
+                </a:solidFill>
+                <a:latin typeface="Arial" panose="020B0604020202020204" pitchFamily="34" charset="0"/>
+                <a:cs typeface="Arial" panose="020B0604020202020204" pitchFamily="34" charset="0"/>
+              </a:rPr>
+              <a:t>(5)</a:t>
+            </a:r>
+          </a:p>
+          <a:p>
+            <a:pPr algn="ctr"/>
+            <a:r>
+              <a:rPr lang="es-MX" dirty="0" smtClean="0">
+                <a:solidFill>
+                  <a:schemeClr val="tx1"/>
+                </a:solidFill>
+                <a:latin typeface="Arial" panose="020B0604020202020204" pitchFamily="34" charset="0"/>
+                <a:cs typeface="Arial" panose="020B0604020202020204" pitchFamily="34" charset="0"/>
+              </a:rPr>
+              <a:t>Simular </a:t>
+            </a:r>
+            <a:r>
               <a:rPr lang="es-MX" dirty="0">
                 <a:solidFill>
                   <a:schemeClr val="tx1"/>
@@ -3182,7 +3303,17 @@
                 <a:latin typeface="Arial" panose="020B0604020202020204" pitchFamily="34" charset="0"/>
                 <a:cs typeface="Arial" panose="020B0604020202020204" pitchFamily="34" charset="0"/>
               </a:rPr>
-              <a:t>Simular esqueletos</a:t>
+              <a:t>las solicitudes de profesores (oculta</a:t>
+            </a:r>
+            <a:r>
+              <a:rPr lang="es-MX" dirty="0" smtClean="0">
+                <a:solidFill>
+                  <a:schemeClr val="tx1"/>
+                </a:solidFill>
+                <a:latin typeface="Arial" panose="020B0604020202020204" pitchFamily="34" charset="0"/>
+                <a:cs typeface="Arial" panose="020B0604020202020204" pitchFamily="34" charset="0"/>
+              </a:rPr>
+              <a:t>)</a:t>
             </a:r>
             <a:endParaRPr lang="fr-FR" dirty="0">
               <a:solidFill>
@@ -3196,17 +3327,17 @@
       </p:sp>
       <p:cxnSp>
         <p:nvCxnSpPr>
-          <p:cNvPr id="8" name="Conector recto de flecha 7"/>
+          <p:cNvPr id="10" name="Conector recto de flecha 9"/>
           <p:cNvCxnSpPr>
-            <a:stCxn id="5" idx="2"/>
-            <a:endCxn id="7" idx="0"/>
+            <a:stCxn id="7" idx="2"/>
+            <a:endCxn id="9" idx="0"/>
           </p:cNvCxnSpPr>
           <p:nvPr/>
         </p:nvCxnSpPr>
         <p:spPr>
           <a:xfrm flipH="1">
-            <a:off x="2645227" y="1595845"/>
-            <a:ext cx="1" cy="350517"/>
+            <a:off x="2980272" y="4292230"/>
+            <a:ext cx="1" cy="299363"/>
           </a:xfrm>
           <a:prstGeom prst="straightConnector1">
             <a:avLst/>
@@ -3235,14 +3366,14 @@
       </p:cxnSp>
       <p:sp>
         <p:nvSpPr>
-          <p:cNvPr id="9" name="Rectángulo 8"/>
+          <p:cNvPr id="11" name="Rectángulo 10"/>
           <p:cNvSpPr/>
           <p:nvPr/>
         </p:nvSpPr>
         <p:spPr>
           <a:xfrm>
-            <a:off x="1449975" y="3069769"/>
-            <a:ext cx="2390503" cy="796834"/>
+            <a:off x="5545818" y="3841418"/>
+            <a:ext cx="2693670" cy="861067"/>
           </a:xfrm>
           <a:prstGeom prst="rect">
             <a:avLst/>
@@ -3283,7 +3414,7 @@
                 <a:latin typeface="Arial" panose="020B0604020202020204" pitchFamily="34" charset="0"/>
                 <a:cs typeface="Arial" panose="020B0604020202020204" pitchFamily="34" charset="0"/>
               </a:rPr>
-              <a:t>Simular las solicitudes de profesores (oculta</a:t>
+              <a:t>Generar la </a:t>
             </a:r>
             <a:r>
               <a:rPr lang="es-MX" dirty="0" smtClean="0">
@@ -3293,9 +3424,48 @@
                 <a:latin typeface="Arial" panose="020B0604020202020204" pitchFamily="34" charset="0"/>
                 <a:cs typeface="Arial" panose="020B0604020202020204" pitchFamily="34" charset="0"/>
               </a:rPr>
-              <a:t>)</a:t>
-            </a:r>
-            <a:endParaRPr lang="fr-FR" dirty="0">
+              <a:t>asignaciones </a:t>
+            </a:r>
+            <a:r>
+              <a:rPr lang="es-MX" dirty="0">
+                <a:solidFill>
+                  <a:schemeClr val="tx1"/>
+                </a:solidFill>
+                <a:latin typeface="Arial" panose="020B0604020202020204" pitchFamily="34" charset="0"/>
+                <a:cs typeface="Arial" panose="020B0604020202020204" pitchFamily="34" charset="0"/>
+              </a:rPr>
+              <a:t>de materia, horario,</a:t>
+            </a:r>
+            <a:r>
+              <a:rPr lang="es-MX" dirty="0" smtClean="0">
+                <a:solidFill>
+                  <a:schemeClr val="tx1"/>
+                </a:solidFill>
+                <a:latin typeface="Arial" panose="020B0604020202020204" pitchFamily="34" charset="0"/>
+                <a:cs typeface="Arial" panose="020B0604020202020204" pitchFamily="34" charset="0"/>
+              </a:rPr>
+              <a:t/>
+            </a:r>
+            <a:br>
+              <a:rPr lang="es-MX" dirty="0" smtClean="0">
+                <a:solidFill>
+                  <a:schemeClr val="tx1"/>
+                </a:solidFill>
+                <a:latin typeface="Arial" panose="020B0604020202020204" pitchFamily="34" charset="0"/>
+                <a:cs typeface="Arial" panose="020B0604020202020204" pitchFamily="34" charset="0"/>
+              </a:rPr>
+            </a:br>
+            <a:r>
+              <a:rPr lang="es-MX" dirty="0">
+                <a:solidFill>
+                  <a:schemeClr val="tx1"/>
+                </a:solidFill>
+                <a:latin typeface="Arial" panose="020B0604020202020204" pitchFamily="34" charset="0"/>
+                <a:cs typeface="Arial" panose="020B0604020202020204" pitchFamily="34" charset="0"/>
+              </a:rPr>
+              <a:t>profesor, (salón).</a:t>
+            </a:r>
+            <a:endParaRPr lang="fr-FR" dirty="0" smtClean="0">
               <a:solidFill>
                 <a:schemeClr val="tx1"/>
               </a:solidFill>
@@ -3307,17 +3477,17 @@
       </p:sp>
       <p:cxnSp>
         <p:nvCxnSpPr>
-          <p:cNvPr id="10" name="Conector recto de flecha 9"/>
+          <p:cNvPr id="12" name="Conector recto de flecha 11"/>
           <p:cNvCxnSpPr>
-            <a:stCxn id="7" idx="2"/>
-            <a:endCxn id="9" idx="0"/>
+            <a:stCxn id="20" idx="2"/>
+            <a:endCxn id="11" idx="0"/>
           </p:cNvCxnSpPr>
           <p:nvPr/>
         </p:nvCxnSpPr>
         <p:spPr>
-          <a:xfrm>
-            <a:off x="2645227" y="2743196"/>
-            <a:ext cx="0" cy="326573"/>
+          <a:xfrm flipH="1">
+            <a:off x="6892653" y="3530718"/>
+            <a:ext cx="469" cy="310700"/>
           </a:xfrm>
           <a:prstGeom prst="straightConnector1">
             <a:avLst/>
@@ -3346,14 +3516,14 @@
       </p:cxnSp>
       <p:sp>
         <p:nvSpPr>
-          <p:cNvPr id="11" name="Rectángulo 10"/>
+          <p:cNvPr id="13" name="Rectángulo 12"/>
           <p:cNvSpPr/>
           <p:nvPr/>
         </p:nvSpPr>
         <p:spPr>
           <a:xfrm>
-            <a:off x="5197655" y="2451192"/>
-            <a:ext cx="2693670" cy="861067"/>
+            <a:off x="1785020" y="5916418"/>
+            <a:ext cx="2390503" cy="796834"/>
           </a:xfrm>
           <a:prstGeom prst="rect">
             <a:avLst/>
@@ -3387,6 +3557,602 @@
           <a:p>
             <a:pPr algn="ctr"/>
             <a:r>
+              <a:rPr lang="es-MX" dirty="0" smtClean="0">
+                <a:solidFill>
+                  <a:schemeClr val="tx1"/>
+                </a:solidFill>
+                <a:latin typeface="Arial" panose="020B0604020202020204" pitchFamily="34" charset="0"/>
+                <a:cs typeface="Arial" panose="020B0604020202020204" pitchFamily="34" charset="0"/>
+              </a:rPr>
+              <a:t>(6)</a:t>
+            </a:r>
+          </a:p>
+          <a:p>
+            <a:pPr algn="ctr"/>
+            <a:r>
+              <a:rPr lang="es-MX" dirty="0" smtClean="0">
+                <a:solidFill>
+                  <a:schemeClr val="tx1"/>
+                </a:solidFill>
+                <a:latin typeface="Arial" panose="020B0604020202020204" pitchFamily="34" charset="0"/>
+                <a:cs typeface="Arial" panose="020B0604020202020204" pitchFamily="34" charset="0"/>
+              </a:rPr>
+              <a:t>Calificar </a:t>
+            </a:r>
+            <a:r>
+              <a:rPr lang="es-MX" dirty="0" smtClean="0">
+                <a:solidFill>
+                  <a:schemeClr val="tx1"/>
+                </a:solidFill>
+                <a:latin typeface="Arial" panose="020B0604020202020204" pitchFamily="34" charset="0"/>
+                <a:cs typeface="Arial" panose="020B0604020202020204" pitchFamily="34" charset="0"/>
+              </a:rPr>
+              <a:t>esqueletos</a:t>
+            </a:r>
+            <a:endParaRPr lang="fr-FR" dirty="0" smtClean="0">
+              <a:solidFill>
+                <a:schemeClr val="tx1"/>
+              </a:solidFill>
+              <a:latin typeface="Arial" panose="020B0604020202020204" pitchFamily="34" charset="0"/>
+              <a:cs typeface="Arial" panose="020B0604020202020204" pitchFamily="34" charset="0"/>
+            </a:endParaRPr>
+          </a:p>
+        </p:txBody>
+      </p:sp>
+      <p:sp>
+        <p:nvSpPr>
+          <p:cNvPr id="15" name="Decisión 14"/>
+          <p:cNvSpPr/>
+          <p:nvPr/>
+        </p:nvSpPr>
+        <p:spPr>
+          <a:xfrm>
+            <a:off x="4977167" y="464171"/>
+            <a:ext cx="3806240" cy="1877761"/>
+          </a:xfrm>
+          <a:prstGeom prst="flowChartDecision">
+            <a:avLst/>
+          </a:prstGeom>
+          <a:noFill/>
+          <a:ln>
+            <a:solidFill>
+              <a:schemeClr val="tx1"/>
+            </a:solidFill>
+          </a:ln>
+        </p:spPr>
+        <p:style>
+          <a:lnRef idx="2">
+            <a:schemeClr val="accent1">
+              <a:shade val="50000"/>
+            </a:schemeClr>
+          </a:lnRef>
+          <a:fillRef idx="1">
+            <a:schemeClr val="accent1"/>
+          </a:fillRef>
+          <a:effectRef idx="0">
+            <a:schemeClr val="accent1"/>
+          </a:effectRef>
+          <a:fontRef idx="minor">
+            <a:schemeClr val="lt1"/>
+          </a:fontRef>
+        </p:style>
+        <p:txBody>
+          <a:bodyPr rtlCol="0" anchor="ctr"/>
+          <a:lstStyle/>
+          <a:p>
+            <a:pPr algn="ctr"/>
+            <a:r>
+              <a:rPr lang="fr-FR" dirty="0" smtClean="0">
+                <a:solidFill>
+                  <a:schemeClr val="tx1"/>
+                </a:solidFill>
+                <a:latin typeface="Arial" panose="020B0604020202020204" pitchFamily="34" charset="0"/>
+                <a:cs typeface="Arial" panose="020B0604020202020204" pitchFamily="34" charset="0"/>
+              </a:rPr>
+              <a:t>¿Se </a:t>
+            </a:r>
+            <a:r>
+              <a:rPr lang="fr-FR" dirty="0" smtClean="0">
+                <a:solidFill>
+                  <a:schemeClr val="tx1"/>
+                </a:solidFill>
+                <a:latin typeface="Arial" panose="020B0604020202020204" pitchFamily="34" charset="0"/>
+                <a:cs typeface="Arial" panose="020B0604020202020204" pitchFamily="34" charset="0"/>
+              </a:rPr>
+              <a:t>encontró un buen esqueleto con </a:t>
+            </a:r>
+            <a:r>
+              <a:rPr lang="fr-FR" dirty="0" smtClean="0">
+                <a:solidFill>
+                  <a:schemeClr val="tx1"/>
+                </a:solidFill>
+                <a:latin typeface="Arial" panose="020B0604020202020204" pitchFamily="34" charset="0"/>
+                <a:cs typeface="Arial" panose="020B0604020202020204" pitchFamily="34" charset="0"/>
+              </a:rPr>
+              <a:t>AG?</a:t>
+            </a:r>
+            <a:endParaRPr lang="fr-FR" dirty="0">
+              <a:solidFill>
+                <a:schemeClr val="tx1"/>
+              </a:solidFill>
+              <a:latin typeface="Arial" panose="020B0604020202020204" pitchFamily="34" charset="0"/>
+              <a:cs typeface="Arial" panose="020B0604020202020204" pitchFamily="34" charset="0"/>
+            </a:endParaRPr>
+          </a:p>
+        </p:txBody>
+      </p:sp>
+      <p:cxnSp>
+        <p:nvCxnSpPr>
+          <p:cNvPr id="17" name="Conector angular 16"/>
+          <p:cNvCxnSpPr>
+            <a:stCxn id="15" idx="0"/>
+            <a:endCxn id="7" idx="3"/>
+          </p:cNvCxnSpPr>
+          <p:nvPr/>
+        </p:nvCxnSpPr>
+        <p:spPr>
+          <a:xfrm rot="16200000" flipH="1" flipV="1">
+            <a:off x="3813085" y="826610"/>
+            <a:ext cx="3429642" cy="2704763"/>
+          </a:xfrm>
+          <a:prstGeom prst="bentConnector4">
+            <a:avLst>
+              <a:gd name="adj1" fmla="val -8604"/>
+              <a:gd name="adj2" fmla="val 90098"/>
+            </a:avLst>
+          </a:prstGeom>
+          <a:ln>
+            <a:solidFill>
+              <a:schemeClr val="tx1"/>
+            </a:solidFill>
+            <a:tailEnd type="triangle"/>
+          </a:ln>
+        </p:spPr>
+        <p:style>
+          <a:lnRef idx="1">
+            <a:schemeClr val="accent1"/>
+          </a:lnRef>
+          <a:fillRef idx="0">
+            <a:schemeClr val="accent1"/>
+          </a:fillRef>
+          <a:effectRef idx="0">
+            <a:schemeClr val="accent1"/>
+          </a:effectRef>
+          <a:fontRef idx="minor">
+            <a:schemeClr val="tx1"/>
+          </a:fontRef>
+        </p:style>
+      </p:cxnSp>
+      <p:sp>
+        <p:nvSpPr>
+          <p:cNvPr id="18" name="CuadroTexto 17"/>
+          <p:cNvSpPr txBox="1"/>
+          <p:nvPr/>
+        </p:nvSpPr>
+        <p:spPr>
+          <a:xfrm>
+            <a:off x="5434984" y="229041"/>
+            <a:ext cx="1051560" cy="369332"/>
+          </a:xfrm>
+          <a:prstGeom prst="rect">
+            <a:avLst/>
+          </a:prstGeom>
+          <a:noFill/>
+        </p:spPr>
+        <p:txBody>
+          <a:bodyPr wrap="square" rtlCol="0">
+            <a:spAutoFit/>
+          </a:bodyPr>
+          <a:lstStyle/>
+          <a:p>
+            <a:r>
+              <a:rPr lang="fr-FR" dirty="0" smtClean="0"/>
+              <a:t>No</a:t>
+            </a:r>
+            <a:endParaRPr lang="fr-FR" dirty="0"/>
+          </a:p>
+        </p:txBody>
+      </p:sp>
+      <p:sp>
+        <p:nvSpPr>
+          <p:cNvPr id="19" name="CuadroTexto 18"/>
+          <p:cNvSpPr txBox="1"/>
+          <p:nvPr/>
+        </p:nvSpPr>
+        <p:spPr>
+          <a:xfrm>
+            <a:off x="7084299" y="2350287"/>
+            <a:ext cx="753965" cy="369332"/>
+          </a:xfrm>
+          <a:prstGeom prst="rect">
+            <a:avLst/>
+          </a:prstGeom>
+          <a:noFill/>
+        </p:spPr>
+        <p:txBody>
+          <a:bodyPr wrap="square" rtlCol="0">
+            <a:spAutoFit/>
+          </a:bodyPr>
+          <a:lstStyle/>
+          <a:p>
+            <a:r>
+              <a:rPr lang="fr-FR" dirty="0" smtClean="0"/>
+              <a:t>Si</a:t>
+            </a:r>
+            <a:endParaRPr lang="fr-FR" dirty="0"/>
+          </a:p>
+        </p:txBody>
+      </p:sp>
+      <p:sp>
+        <p:nvSpPr>
+          <p:cNvPr id="20" name="Rectángulo 19"/>
+          <p:cNvSpPr/>
+          <p:nvPr/>
+        </p:nvSpPr>
+        <p:spPr>
+          <a:xfrm>
+            <a:off x="5466551" y="2733884"/>
+            <a:ext cx="2853142" cy="796834"/>
+          </a:xfrm>
+          <a:prstGeom prst="rect">
+            <a:avLst/>
+          </a:prstGeom>
+          <a:noFill/>
+          <a:ln>
+            <a:solidFill>
+              <a:schemeClr val="tx1"/>
+            </a:solidFill>
+          </a:ln>
+        </p:spPr>
+        <p:style>
+          <a:lnRef idx="2">
+            <a:schemeClr val="accent1">
+              <a:shade val="50000"/>
+            </a:schemeClr>
+          </a:lnRef>
+          <a:fillRef idx="1">
+            <a:schemeClr val="accent1"/>
+          </a:fillRef>
+          <a:effectRef idx="0">
+            <a:schemeClr val="accent1"/>
+          </a:effectRef>
+          <a:fontRef idx="minor">
+            <a:schemeClr val="lt1"/>
+          </a:fontRef>
+        </p:style>
+        <p:txBody>
+          <a:bodyPr rtlCol="0" anchor="ctr"/>
+          <a:lstStyle/>
+          <a:p>
+            <a:pPr algn="ctr"/>
+            <a:r>
+              <a:rPr lang="es-MX" dirty="0" smtClean="0">
+                <a:solidFill>
+                  <a:schemeClr val="tx1"/>
+                </a:solidFill>
+                <a:latin typeface="Arial" panose="020B0604020202020204" pitchFamily="34" charset="0"/>
+                <a:cs typeface="Arial" panose="020B0604020202020204" pitchFamily="34" charset="0"/>
+              </a:rPr>
+              <a:t>Simular las solicitudes de profesores (pseudo-real)</a:t>
+            </a:r>
+            <a:endParaRPr lang="fr-FR" dirty="0" smtClean="0">
+              <a:solidFill>
+                <a:schemeClr val="tx1"/>
+              </a:solidFill>
+              <a:latin typeface="Arial" panose="020B0604020202020204" pitchFamily="34" charset="0"/>
+              <a:cs typeface="Arial" panose="020B0604020202020204" pitchFamily="34" charset="0"/>
+            </a:endParaRPr>
+          </a:p>
+        </p:txBody>
+      </p:sp>
+      <p:sp>
+        <p:nvSpPr>
+          <p:cNvPr id="22" name="Rectángulo 21"/>
+          <p:cNvSpPr/>
+          <p:nvPr/>
+        </p:nvSpPr>
+        <p:spPr>
+          <a:xfrm>
+            <a:off x="6067960" y="5018875"/>
+            <a:ext cx="1617073" cy="796834"/>
+          </a:xfrm>
+          <a:prstGeom prst="rect">
+            <a:avLst/>
+          </a:prstGeom>
+          <a:noFill/>
+          <a:ln>
+            <a:solidFill>
+              <a:schemeClr val="tx1"/>
+            </a:solidFill>
+          </a:ln>
+        </p:spPr>
+        <p:style>
+          <a:lnRef idx="2">
+            <a:schemeClr val="accent1">
+              <a:shade val="50000"/>
+            </a:schemeClr>
+          </a:lnRef>
+          <a:fillRef idx="1">
+            <a:schemeClr val="accent1"/>
+          </a:fillRef>
+          <a:effectRef idx="0">
+            <a:schemeClr val="accent1"/>
+          </a:effectRef>
+          <a:fontRef idx="minor">
+            <a:schemeClr val="lt1"/>
+          </a:fontRef>
+        </p:style>
+        <p:txBody>
+          <a:bodyPr rtlCol="0" anchor="ctr"/>
+          <a:lstStyle/>
+          <a:p>
+            <a:pPr algn="ctr"/>
+            <a:r>
+              <a:rPr lang="es-MX" dirty="0" smtClean="0">
+                <a:solidFill>
+                  <a:schemeClr val="tx1"/>
+                </a:solidFill>
+                <a:latin typeface="Arial" panose="020B0604020202020204" pitchFamily="34" charset="0"/>
+                <a:cs typeface="Arial" panose="020B0604020202020204" pitchFamily="34" charset="0"/>
+              </a:rPr>
+              <a:t>Calificar asignaciones</a:t>
+            </a:r>
+            <a:endParaRPr lang="fr-FR" dirty="0" smtClean="0">
+              <a:solidFill>
+                <a:schemeClr val="tx1"/>
+              </a:solidFill>
+              <a:latin typeface="Arial" panose="020B0604020202020204" pitchFamily="34" charset="0"/>
+              <a:cs typeface="Arial" panose="020B0604020202020204" pitchFamily="34" charset="0"/>
+            </a:endParaRPr>
+          </a:p>
+        </p:txBody>
+      </p:sp>
+      <p:sp>
+        <p:nvSpPr>
+          <p:cNvPr id="23" name="Decisión 22"/>
+          <p:cNvSpPr/>
+          <p:nvPr/>
+        </p:nvSpPr>
+        <p:spPr>
+          <a:xfrm>
+            <a:off x="9678483" y="1163814"/>
+            <a:ext cx="2246812" cy="1620889"/>
+          </a:xfrm>
+          <a:prstGeom prst="flowChartDecision">
+            <a:avLst/>
+          </a:prstGeom>
+          <a:noFill/>
+          <a:ln>
+            <a:solidFill>
+              <a:schemeClr val="tx1"/>
+            </a:solidFill>
+          </a:ln>
+        </p:spPr>
+        <p:style>
+          <a:lnRef idx="2">
+            <a:schemeClr val="accent1">
+              <a:shade val="50000"/>
+            </a:schemeClr>
+          </a:lnRef>
+          <a:fillRef idx="1">
+            <a:schemeClr val="accent1"/>
+          </a:fillRef>
+          <a:effectRef idx="0">
+            <a:schemeClr val="accent1"/>
+          </a:effectRef>
+          <a:fontRef idx="minor">
+            <a:schemeClr val="lt1"/>
+          </a:fontRef>
+        </p:style>
+        <p:txBody>
+          <a:bodyPr rtlCol="0" anchor="ctr"/>
+          <a:lstStyle/>
+          <a:p>
+            <a:pPr algn="ctr"/>
+            <a:r>
+              <a:rPr lang="fr-FR" dirty="0" smtClean="0">
+                <a:solidFill>
+                  <a:schemeClr val="tx1"/>
+                </a:solidFill>
+                <a:latin typeface="Arial" panose="020B0604020202020204" pitchFamily="34" charset="0"/>
+                <a:cs typeface="Arial" panose="020B0604020202020204" pitchFamily="34" charset="0"/>
+              </a:rPr>
+              <a:t>¿Se llegó al óptimo con AG?</a:t>
+            </a:r>
+            <a:endParaRPr lang="fr-FR" dirty="0">
+              <a:solidFill>
+                <a:schemeClr val="tx1"/>
+              </a:solidFill>
+              <a:latin typeface="Arial" panose="020B0604020202020204" pitchFamily="34" charset="0"/>
+              <a:cs typeface="Arial" panose="020B0604020202020204" pitchFamily="34" charset="0"/>
+            </a:endParaRPr>
+          </a:p>
+        </p:txBody>
+      </p:sp>
+      <p:cxnSp>
+        <p:nvCxnSpPr>
+          <p:cNvPr id="25" name="Conector angular 24"/>
+          <p:cNvCxnSpPr>
+            <a:stCxn id="23" idx="0"/>
+            <a:endCxn id="11" idx="3"/>
+          </p:cNvCxnSpPr>
+          <p:nvPr/>
+        </p:nvCxnSpPr>
+        <p:spPr>
+          <a:xfrm rot="16200000" flipH="1" flipV="1">
+            <a:off x="7966620" y="1436682"/>
+            <a:ext cx="3108138" cy="2562401"/>
+          </a:xfrm>
+          <a:prstGeom prst="bentConnector4">
+            <a:avLst>
+              <a:gd name="adj1" fmla="val -7355"/>
+              <a:gd name="adj2" fmla="val 74516"/>
+            </a:avLst>
+          </a:prstGeom>
+          <a:ln>
+            <a:solidFill>
+              <a:schemeClr val="tx1"/>
+            </a:solidFill>
+            <a:tailEnd type="triangle"/>
+          </a:ln>
+        </p:spPr>
+        <p:style>
+          <a:lnRef idx="1">
+            <a:schemeClr val="accent1"/>
+          </a:lnRef>
+          <a:fillRef idx="0">
+            <a:schemeClr val="accent1"/>
+          </a:fillRef>
+          <a:effectRef idx="0">
+            <a:schemeClr val="accent1"/>
+          </a:effectRef>
+          <a:fontRef idx="minor">
+            <a:schemeClr val="tx1"/>
+          </a:fontRef>
+        </p:style>
+      </p:cxnSp>
+      <p:sp>
+        <p:nvSpPr>
+          <p:cNvPr id="26" name="CuadroTexto 25"/>
+          <p:cNvSpPr txBox="1"/>
+          <p:nvPr/>
+        </p:nvSpPr>
+        <p:spPr>
+          <a:xfrm>
+            <a:off x="9973289" y="581556"/>
+            <a:ext cx="1051560" cy="369332"/>
+          </a:xfrm>
+          <a:prstGeom prst="rect">
+            <a:avLst/>
+          </a:prstGeom>
+          <a:noFill/>
+        </p:spPr>
+        <p:txBody>
+          <a:bodyPr wrap="square" rtlCol="0">
+            <a:spAutoFit/>
+          </a:bodyPr>
+          <a:lstStyle/>
+          <a:p>
+            <a:r>
+              <a:rPr lang="fr-FR" dirty="0" smtClean="0"/>
+              <a:t>No</a:t>
+            </a:r>
+            <a:endParaRPr lang="fr-FR" dirty="0"/>
+          </a:p>
+        </p:txBody>
+      </p:sp>
+      <p:sp>
+        <p:nvSpPr>
+          <p:cNvPr id="27" name="CuadroTexto 26"/>
+          <p:cNvSpPr txBox="1"/>
+          <p:nvPr/>
+        </p:nvSpPr>
+        <p:spPr>
+          <a:xfrm>
+            <a:off x="10830539" y="2784703"/>
+            <a:ext cx="388620" cy="369332"/>
+          </a:xfrm>
+          <a:prstGeom prst="rect">
+            <a:avLst/>
+          </a:prstGeom>
+          <a:noFill/>
+        </p:spPr>
+        <p:txBody>
+          <a:bodyPr wrap="square" rtlCol="0">
+            <a:spAutoFit/>
+          </a:bodyPr>
+          <a:lstStyle/>
+          <a:p>
+            <a:r>
+              <a:rPr lang="fr-FR" dirty="0" smtClean="0"/>
+              <a:t>Si</a:t>
+            </a:r>
+            <a:endParaRPr lang="fr-FR" dirty="0"/>
+          </a:p>
+        </p:txBody>
+      </p:sp>
+      <p:cxnSp>
+        <p:nvCxnSpPr>
+          <p:cNvPr id="29" name="Conector recto de flecha 28"/>
+          <p:cNvCxnSpPr>
+            <a:stCxn id="11" idx="2"/>
+            <a:endCxn id="22" idx="0"/>
+          </p:cNvCxnSpPr>
+          <p:nvPr/>
+        </p:nvCxnSpPr>
+        <p:spPr>
+          <a:xfrm flipH="1">
+            <a:off x="6876497" y="4702485"/>
+            <a:ext cx="16156" cy="316390"/>
+          </a:xfrm>
+          <a:prstGeom prst="straightConnector1">
+            <a:avLst/>
+          </a:prstGeom>
+          <a:ln>
+            <a:solidFill>
+              <a:schemeClr val="tx1"/>
+            </a:solidFill>
+            <a:tailEnd type="triangle"/>
+          </a:ln>
+        </p:spPr>
+        <p:style>
+          <a:lnRef idx="1">
+            <a:schemeClr val="accent1"/>
+          </a:lnRef>
+          <a:fillRef idx="0">
+            <a:schemeClr val="accent1"/>
+          </a:fillRef>
+          <a:effectRef idx="0">
+            <a:schemeClr val="accent1"/>
+          </a:effectRef>
+          <a:fontRef idx="minor">
+            <a:schemeClr val="tx1"/>
+          </a:fontRef>
+        </p:style>
+      </p:cxnSp>
+      <p:sp>
+        <p:nvSpPr>
+          <p:cNvPr id="30" name="Documento 29"/>
+          <p:cNvSpPr/>
+          <p:nvPr/>
+        </p:nvSpPr>
+        <p:spPr>
+          <a:xfrm>
+            <a:off x="9520689" y="3273197"/>
+            <a:ext cx="2588762" cy="1429288"/>
+          </a:xfrm>
+          <a:prstGeom prst="flowChartDocument">
+            <a:avLst/>
+          </a:prstGeom>
+          <a:noFill/>
+          <a:ln>
+            <a:solidFill>
+              <a:schemeClr val="tx1"/>
+            </a:solidFill>
+          </a:ln>
+        </p:spPr>
+        <p:style>
+          <a:lnRef idx="2">
+            <a:schemeClr val="accent1">
+              <a:shade val="50000"/>
+            </a:schemeClr>
+          </a:lnRef>
+          <a:fillRef idx="1">
+            <a:schemeClr val="accent1"/>
+          </a:fillRef>
+          <a:effectRef idx="0">
+            <a:schemeClr val="accent1"/>
+          </a:effectRef>
+          <a:fontRef idx="minor">
+            <a:schemeClr val="lt1"/>
+          </a:fontRef>
+        </p:style>
+        <p:txBody>
+          <a:bodyPr rtlCol="0" anchor="ctr"/>
+          <a:lstStyle/>
+          <a:p>
+            <a:pPr algn="ctr"/>
+            <a:r>
               <a:rPr lang="es-MX" dirty="0">
                 <a:solidFill>
                   <a:schemeClr val="tx1"/>
@@ -3394,7 +4160,7 @@
                 <a:latin typeface="Arial" panose="020B0604020202020204" pitchFamily="34" charset="0"/>
                 <a:cs typeface="Arial" panose="020B0604020202020204" pitchFamily="34" charset="0"/>
               </a:rPr>
-              <a:t>Generar la </a:t>
+              <a:t>Matriz de </a:t>
             </a:r>
             <a:r>
               <a:rPr lang="es-MX" dirty="0" smtClean="0">
@@ -3404,7 +4170,7 @@
                 <a:latin typeface="Arial" panose="020B0604020202020204" pitchFamily="34" charset="0"/>
                 <a:cs typeface="Arial" panose="020B0604020202020204" pitchFamily="34" charset="0"/>
               </a:rPr>
-              <a:t>asignaciones </a:t>
+              <a:t>3 </a:t>
             </a:r>
             <a:r>
               <a:rPr lang="es-MX" dirty="0">
@@ -3414,7 +4180,7 @@
                 <a:latin typeface="Arial" panose="020B0604020202020204" pitchFamily="34" charset="0"/>
                 <a:cs typeface="Arial" panose="020B0604020202020204" pitchFamily="34" charset="0"/>
               </a:rPr>
-              <a:t>de materia, horario,</a:t>
+              <a:t>columnas con la asignación de materia, horario,</a:t>
             </a:r>
             <a:r>
               <a:rPr lang="es-MX" dirty="0" smtClean="0">
@@ -3436,16 +4202,16 @@
               </a:rPr>
             </a:br>
             <a:r>
-              <a:rPr lang="es-MX" dirty="0">
+              <a:rPr lang="es-MX" dirty="0" smtClean="0">
                 <a:solidFill>
                   <a:schemeClr val="tx1"/>
                 </a:solidFill>
                 <a:latin typeface="Arial" panose="020B0604020202020204" pitchFamily="34" charset="0"/>
                 <a:cs typeface="Arial" panose="020B0604020202020204" pitchFamily="34" charset="0"/>
               </a:rPr>
-              <a:t>profesor, (salón).</a:t>
-            </a:r>
-            <a:endParaRPr lang="fr-FR" dirty="0" smtClean="0">
+              <a:t>profesor.</a:t>
+            </a:r>
+            <a:endParaRPr lang="fr-FR" dirty="0">
               <a:solidFill>
                 <a:schemeClr val="tx1"/>
               </a:solidFill>
@@ -3455,19 +4221,81 @@
           </a:p>
         </p:txBody>
       </p:sp>
+      <p:sp>
+        <p:nvSpPr>
+          <p:cNvPr id="31" name="Elipse 30"/>
+          <p:cNvSpPr/>
+          <p:nvPr/>
+        </p:nvSpPr>
+        <p:spPr>
+          <a:xfrm>
+            <a:off x="10122738" y="5091772"/>
+            <a:ext cx="1384663" cy="470261"/>
+          </a:xfrm>
+          <a:prstGeom prst="ellipse">
+            <a:avLst/>
+          </a:prstGeom>
+          <a:noFill/>
+          <a:ln>
+            <a:solidFill>
+              <a:schemeClr val="tx1"/>
+            </a:solidFill>
+          </a:ln>
+        </p:spPr>
+        <p:style>
+          <a:lnRef idx="2">
+            <a:schemeClr val="accent1">
+              <a:shade val="50000"/>
+            </a:schemeClr>
+          </a:lnRef>
+          <a:fillRef idx="1">
+            <a:schemeClr val="accent1"/>
+          </a:fillRef>
+          <a:effectRef idx="0">
+            <a:schemeClr val="accent1"/>
+          </a:effectRef>
+          <a:fontRef idx="minor">
+            <a:schemeClr val="lt1"/>
+          </a:fontRef>
+        </p:style>
+        <p:txBody>
+          <a:bodyPr rtlCol="0" anchor="ctr"/>
+          <a:lstStyle/>
+          <a:p>
+            <a:pPr algn="ctr"/>
+            <a:r>
+              <a:rPr lang="fr-FR" dirty="0" smtClean="0">
+                <a:solidFill>
+                  <a:schemeClr val="tx1"/>
+                </a:solidFill>
+                <a:latin typeface="Arial" panose="020B0604020202020204" pitchFamily="34" charset="0"/>
+                <a:cs typeface="Arial" panose="020B0604020202020204" pitchFamily="34" charset="0"/>
+              </a:rPr>
+              <a:t>Fin</a:t>
+            </a:r>
+            <a:endParaRPr lang="fr-FR" dirty="0">
+              <a:solidFill>
+                <a:schemeClr val="tx1"/>
+              </a:solidFill>
+              <a:latin typeface="Arial" panose="020B0604020202020204" pitchFamily="34" charset="0"/>
+              <a:cs typeface="Arial" panose="020B0604020202020204" pitchFamily="34" charset="0"/>
+            </a:endParaRPr>
+          </a:p>
+        </p:txBody>
+      </p:sp>
       <p:cxnSp>
         <p:nvCxnSpPr>
-          <p:cNvPr id="12" name="Conector recto de flecha 11"/>
+          <p:cNvPr id="32" name="Conector recto de flecha 31"/>
           <p:cNvCxnSpPr>
-            <a:stCxn id="20" idx="2"/>
-            <a:endCxn id="11" idx="0"/>
+            <a:stCxn id="30" idx="2"/>
+            <a:endCxn id="31" idx="0"/>
           </p:cNvCxnSpPr>
           <p:nvPr/>
         </p:nvCxnSpPr>
         <p:spPr>
           <a:xfrm>
-            <a:off x="6544490" y="2169520"/>
-            <a:ext cx="0" cy="281672"/>
+            <a:off x="10815070" y="4607993"/>
+            <a:ext cx="0" cy="483779"/>
           </a:xfrm>
           <a:prstGeom prst="straightConnector1">
             <a:avLst/>
@@ -3496,13 +4324,13 @@
       </p:cxnSp>
       <p:sp>
         <p:nvSpPr>
-          <p:cNvPr id="13" name="Rectángulo 12"/>
+          <p:cNvPr id="33" name="Rectángulo 32"/>
           <p:cNvSpPr/>
           <p:nvPr/>
         </p:nvSpPr>
         <p:spPr>
           <a:xfrm>
-            <a:off x="1449975" y="4193176"/>
+            <a:off x="1785022" y="1163814"/>
             <a:ext cx="2390503" cy="796834"/>
           </a:xfrm>
           <a:prstGeom prst="rect">
@@ -3544,7 +4372,20 @@
                 <a:latin typeface="Arial" panose="020B0604020202020204" pitchFamily="34" charset="0"/>
                 <a:cs typeface="Arial" panose="020B0604020202020204" pitchFamily="34" charset="0"/>
               </a:rPr>
-              <a:t>Calificar esqueletos</a:t>
+              <a:t>(2)</a:t>
+            </a:r>
+          </a:p>
+          <a:p>
+            <a:pPr algn="ctr"/>
+            <a:r>
+              <a:rPr lang="es-MX" dirty="0" smtClean="0">
+                <a:solidFill>
+                  <a:schemeClr val="tx1"/>
+                </a:solidFill>
+                <a:latin typeface="Arial" panose="020B0604020202020204" pitchFamily="34" charset="0"/>
+                <a:cs typeface="Arial" panose="020B0604020202020204" pitchFamily="34" charset="0"/>
+              </a:rPr>
+              <a:t>Limpieza de datos</a:t>
             </a:r>
             <a:endParaRPr lang="fr-FR" dirty="0" smtClean="0">
               <a:solidFill>
@@ -3556,19 +4397,104 @@
           </a:p>
         </p:txBody>
       </p:sp>
+      <p:sp>
+        <p:nvSpPr>
+          <p:cNvPr id="34" name="Rectángulo 33"/>
+          <p:cNvSpPr/>
+          <p:nvPr/>
+        </p:nvSpPr>
+        <p:spPr>
+          <a:xfrm>
+            <a:off x="1785021" y="2329605"/>
+            <a:ext cx="2390503" cy="796834"/>
+          </a:xfrm>
+          <a:prstGeom prst="rect">
+            <a:avLst/>
+          </a:prstGeom>
+          <a:noFill/>
+          <a:ln>
+            <a:solidFill>
+              <a:schemeClr val="tx1"/>
+            </a:solidFill>
+          </a:ln>
+        </p:spPr>
+        <p:style>
+          <a:lnRef idx="2">
+            <a:schemeClr val="accent1">
+              <a:shade val="50000"/>
+            </a:schemeClr>
+          </a:lnRef>
+          <a:fillRef idx="1">
+            <a:schemeClr val="accent1"/>
+          </a:fillRef>
+          <a:effectRef idx="0">
+            <a:schemeClr val="accent1"/>
+          </a:effectRef>
+          <a:fontRef idx="minor">
+            <a:schemeClr val="lt1"/>
+          </a:fontRef>
+        </p:style>
+        <p:txBody>
+          <a:bodyPr rtlCol="0" anchor="ctr"/>
+          <a:lstStyle/>
+          <a:p>
+            <a:pPr algn="ctr"/>
+            <a:r>
+              <a:rPr lang="es-MX" dirty="0" smtClean="0">
+                <a:solidFill>
+                  <a:schemeClr val="tx1"/>
+                </a:solidFill>
+                <a:latin typeface="Arial" panose="020B0604020202020204" pitchFamily="34" charset="0"/>
+                <a:cs typeface="Arial" panose="020B0604020202020204" pitchFamily="34" charset="0"/>
+              </a:rPr>
+              <a:t>(3)</a:t>
+            </a:r>
+          </a:p>
+          <a:p>
+            <a:pPr algn="ctr"/>
+            <a:r>
+              <a:rPr lang="es-MX" dirty="0" smtClean="0">
+                <a:solidFill>
+                  <a:schemeClr val="tx1"/>
+                </a:solidFill>
+                <a:latin typeface="Arial" panose="020B0604020202020204" pitchFamily="34" charset="0"/>
+                <a:cs typeface="Arial" panose="020B0604020202020204" pitchFamily="34" charset="0"/>
+              </a:rPr>
+              <a:t>Simular </a:t>
+            </a:r>
+            <a:r>
+              <a:rPr lang="es-MX" dirty="0">
+                <a:solidFill>
+                  <a:schemeClr val="tx1"/>
+                </a:solidFill>
+                <a:latin typeface="Arial" panose="020B0604020202020204" pitchFamily="34" charset="0"/>
+                <a:cs typeface="Arial" panose="020B0604020202020204" pitchFamily="34" charset="0"/>
+              </a:rPr>
+              <a:t>demanda de alumnos para t+1</a:t>
+            </a:r>
+            <a:endParaRPr lang="fr-FR" dirty="0">
+              <a:solidFill>
+                <a:schemeClr val="tx1"/>
+              </a:solidFill>
+              <a:latin typeface="Arial" panose="020B0604020202020204" pitchFamily="34" charset="0"/>
+              <a:cs typeface="Arial" panose="020B0604020202020204" pitchFamily="34" charset="0"/>
+            </a:endParaRPr>
+          </a:p>
+        </p:txBody>
+      </p:sp>
       <p:cxnSp>
         <p:nvCxnSpPr>
-          <p:cNvPr id="14" name="Conector recto de flecha 13"/>
+          <p:cNvPr id="35" name="Conector recto de flecha 34"/>
           <p:cNvCxnSpPr>
-            <a:stCxn id="9" idx="2"/>
-            <a:endCxn id="13" idx="0"/>
+            <a:stCxn id="33" idx="2"/>
+            <a:endCxn id="34" idx="0"/>
           </p:cNvCxnSpPr>
           <p:nvPr/>
         </p:nvCxnSpPr>
         <p:spPr>
-          <a:xfrm>
-            <a:off x="2645227" y="3866603"/>
-            <a:ext cx="0" cy="326573"/>
+          <a:xfrm flipH="1">
+            <a:off x="2980273" y="1960648"/>
+            <a:ext cx="1" cy="368957"/>
           </a:xfrm>
           <a:prstGeom prst="straightConnector1">
             <a:avLst/>
@@ -3595,81 +4521,19 @@
           </a:fontRef>
         </p:style>
       </p:cxnSp>
-      <p:sp>
-        <p:nvSpPr>
-          <p:cNvPr id="15" name="Decisión 14"/>
-          <p:cNvSpPr/>
-          <p:nvPr/>
-        </p:nvSpPr>
-        <p:spPr>
-          <a:xfrm>
-            <a:off x="1530530" y="5237111"/>
-            <a:ext cx="2246812" cy="1620889"/>
-          </a:xfrm>
-          <a:prstGeom prst="flowChartDecision">
-            <a:avLst/>
-          </a:prstGeom>
-          <a:noFill/>
-          <a:ln>
-            <a:solidFill>
-              <a:schemeClr val="tx1"/>
-            </a:solidFill>
-          </a:ln>
-        </p:spPr>
-        <p:style>
-          <a:lnRef idx="2">
-            <a:schemeClr val="accent1">
-              <a:shade val="50000"/>
-            </a:schemeClr>
-          </a:lnRef>
-          <a:fillRef idx="1">
-            <a:schemeClr val="accent1"/>
-          </a:fillRef>
-          <a:effectRef idx="0">
-            <a:schemeClr val="accent1"/>
-          </a:effectRef>
-          <a:fontRef idx="minor">
-            <a:schemeClr val="lt1"/>
-          </a:fontRef>
-        </p:style>
-        <p:txBody>
-          <a:bodyPr rtlCol="0" anchor="ctr"/>
-          <a:lstStyle/>
-          <a:p>
-            <a:pPr algn="ctr"/>
-            <a:r>
-              <a:rPr lang="fr-FR" dirty="0" smtClean="0">
-                <a:solidFill>
-                  <a:schemeClr val="tx1"/>
-                </a:solidFill>
-                <a:latin typeface="Arial" panose="020B0604020202020204" pitchFamily="34" charset="0"/>
-                <a:cs typeface="Arial" panose="020B0604020202020204" pitchFamily="34" charset="0"/>
-              </a:rPr>
-              <a:t>¿Se llegó al óptimo con AG?</a:t>
-            </a:r>
-            <a:endParaRPr lang="fr-FR" dirty="0">
-              <a:solidFill>
-                <a:schemeClr val="tx1"/>
-              </a:solidFill>
-              <a:latin typeface="Arial" panose="020B0604020202020204" pitchFamily="34" charset="0"/>
-              <a:cs typeface="Arial" panose="020B0604020202020204" pitchFamily="34" charset="0"/>
-            </a:endParaRPr>
-          </a:p>
-        </p:txBody>
-      </p:sp>
       <p:cxnSp>
         <p:nvCxnSpPr>
-          <p:cNvPr id="16" name="Conector recto de flecha 15"/>
+          <p:cNvPr id="36" name="Conector recto de flecha 35"/>
           <p:cNvCxnSpPr>
-            <a:stCxn id="13" idx="2"/>
-            <a:endCxn id="15" idx="0"/>
+            <a:stCxn id="34" idx="2"/>
+            <a:endCxn id="7" idx="0"/>
           </p:cNvCxnSpPr>
           <p:nvPr/>
         </p:nvCxnSpPr>
         <p:spPr>
           <a:xfrm>
-            <a:off x="2645227" y="4990010"/>
-            <a:ext cx="8709" cy="247101"/>
+            <a:off x="2980273" y="3126439"/>
+            <a:ext cx="0" cy="368957"/>
           </a:xfrm>
           <a:prstGeom prst="straightConnector1">
             <a:avLst/>
@@ -3698,345 +4562,17 @@
       </p:cxnSp>
       <p:cxnSp>
         <p:nvCxnSpPr>
-          <p:cNvPr id="17" name="Conector angular 16"/>
+          <p:cNvPr id="82" name="Conector recto de flecha 81"/>
           <p:cNvCxnSpPr>
-            <a:stCxn id="15" idx="1"/>
-            <a:endCxn id="7" idx="1"/>
+            <a:stCxn id="9" idx="2"/>
+            <a:endCxn id="13" idx="0"/>
           </p:cNvCxnSpPr>
           <p:nvPr/>
         </p:nvCxnSpPr>
         <p:spPr>
-          <a:xfrm rot="10800000">
-            <a:off x="1449976" y="2344780"/>
-            <a:ext cx="80555" cy="3702777"/>
-          </a:xfrm>
-          <a:prstGeom prst="bentConnector3">
-            <a:avLst>
-              <a:gd name="adj1" fmla="val 578374"/>
-            </a:avLst>
-          </a:prstGeom>
-          <a:ln>
-            <a:solidFill>
-              <a:schemeClr val="tx1"/>
-            </a:solidFill>
-            <a:tailEnd type="triangle"/>
-          </a:ln>
-        </p:spPr>
-        <p:style>
-          <a:lnRef idx="1">
-            <a:schemeClr val="accent1"/>
-          </a:lnRef>
-          <a:fillRef idx="0">
-            <a:schemeClr val="accent1"/>
-          </a:fillRef>
-          <a:effectRef idx="0">
-            <a:schemeClr val="accent1"/>
-          </a:effectRef>
-          <a:fontRef idx="minor">
-            <a:schemeClr val="tx1"/>
-          </a:fontRef>
-        </p:style>
-      </p:cxnSp>
-      <p:sp>
-        <p:nvSpPr>
-          <p:cNvPr id="18" name="CuadroTexto 17"/>
-          <p:cNvSpPr txBox="1"/>
-          <p:nvPr/>
-        </p:nvSpPr>
-        <p:spPr>
           <a:xfrm>
-            <a:off x="1087205" y="5748974"/>
-            <a:ext cx="1051560" cy="369332"/>
-          </a:xfrm>
-          <a:prstGeom prst="rect">
-            <a:avLst/>
-          </a:prstGeom>
-          <a:noFill/>
-        </p:spPr>
-        <p:txBody>
-          <a:bodyPr wrap="square" rtlCol="0">
-            <a:spAutoFit/>
-          </a:bodyPr>
-          <a:lstStyle/>
-          <a:p>
-            <a:r>
-              <a:rPr lang="fr-FR" dirty="0" smtClean="0"/>
-              <a:t>No</a:t>
-            </a:r>
-            <a:endParaRPr lang="fr-FR" dirty="0"/>
-          </a:p>
-        </p:txBody>
-      </p:sp>
-      <p:sp>
-        <p:nvSpPr>
-          <p:cNvPr id="19" name="CuadroTexto 18"/>
-          <p:cNvSpPr txBox="1"/>
-          <p:nvPr/>
-        </p:nvSpPr>
-        <p:spPr>
-          <a:xfrm>
-            <a:off x="3840478" y="5748974"/>
-            <a:ext cx="753965" cy="369332"/>
-          </a:xfrm>
-          <a:prstGeom prst="rect">
-            <a:avLst/>
-          </a:prstGeom>
-          <a:noFill/>
-        </p:spPr>
-        <p:txBody>
-          <a:bodyPr wrap="square" rtlCol="0">
-            <a:spAutoFit/>
-          </a:bodyPr>
-          <a:lstStyle/>
-          <a:p>
-            <a:r>
-              <a:rPr lang="fr-FR" dirty="0" smtClean="0"/>
-              <a:t>Si</a:t>
-            </a:r>
-            <a:endParaRPr lang="fr-FR" dirty="0"/>
-          </a:p>
-        </p:txBody>
-      </p:sp>
-      <p:sp>
-        <p:nvSpPr>
-          <p:cNvPr id="20" name="Rectángulo 19"/>
-          <p:cNvSpPr/>
-          <p:nvPr/>
-        </p:nvSpPr>
-        <p:spPr>
-          <a:xfrm>
-            <a:off x="5117919" y="1372686"/>
-            <a:ext cx="2853142" cy="796834"/>
-          </a:xfrm>
-          <a:prstGeom prst="rect">
-            <a:avLst/>
-          </a:prstGeom>
-          <a:noFill/>
-          <a:ln>
-            <a:solidFill>
-              <a:schemeClr val="tx1"/>
-            </a:solidFill>
-          </a:ln>
-        </p:spPr>
-        <p:style>
-          <a:lnRef idx="2">
-            <a:schemeClr val="accent1">
-              <a:shade val="50000"/>
-            </a:schemeClr>
-          </a:lnRef>
-          <a:fillRef idx="1">
-            <a:schemeClr val="accent1"/>
-          </a:fillRef>
-          <a:effectRef idx="0">
-            <a:schemeClr val="accent1"/>
-          </a:effectRef>
-          <a:fontRef idx="minor">
-            <a:schemeClr val="lt1"/>
-          </a:fontRef>
-        </p:style>
-        <p:txBody>
-          <a:bodyPr rtlCol="0" anchor="ctr"/>
-          <a:lstStyle/>
-          <a:p>
-            <a:pPr algn="ctr"/>
-            <a:r>
-              <a:rPr lang="es-MX" dirty="0" smtClean="0">
-                <a:solidFill>
-                  <a:schemeClr val="tx1"/>
-                </a:solidFill>
-                <a:latin typeface="Arial" panose="020B0604020202020204" pitchFamily="34" charset="0"/>
-                <a:cs typeface="Arial" panose="020B0604020202020204" pitchFamily="34" charset="0"/>
-              </a:rPr>
-              <a:t>Simular las solicitudes de profesores (pseudo-real)</a:t>
-            </a:r>
-            <a:endParaRPr lang="fr-FR" dirty="0" smtClean="0">
-              <a:solidFill>
-                <a:schemeClr val="tx1"/>
-              </a:solidFill>
-              <a:latin typeface="Arial" panose="020B0604020202020204" pitchFamily="34" charset="0"/>
-              <a:cs typeface="Arial" panose="020B0604020202020204" pitchFamily="34" charset="0"/>
-            </a:endParaRPr>
-          </a:p>
-        </p:txBody>
-      </p:sp>
-      <p:cxnSp>
-        <p:nvCxnSpPr>
-          <p:cNvPr id="21" name="Conector angular 20"/>
-          <p:cNvCxnSpPr>
-            <a:stCxn id="15" idx="3"/>
-            <a:endCxn id="20" idx="1"/>
-          </p:cNvCxnSpPr>
-          <p:nvPr/>
-        </p:nvCxnSpPr>
-        <p:spPr>
-          <a:xfrm flipV="1">
-            <a:off x="3777342" y="1771103"/>
-            <a:ext cx="1340577" cy="4276453"/>
-          </a:xfrm>
-          <a:prstGeom prst="bentConnector3">
-            <a:avLst>
-              <a:gd name="adj1" fmla="val 50000"/>
-            </a:avLst>
-          </a:prstGeom>
-          <a:ln>
-            <a:solidFill>
-              <a:schemeClr val="tx1"/>
-            </a:solidFill>
-            <a:tailEnd type="triangle"/>
-          </a:ln>
-        </p:spPr>
-        <p:style>
-          <a:lnRef idx="1">
-            <a:schemeClr val="accent1"/>
-          </a:lnRef>
-          <a:fillRef idx="0">
-            <a:schemeClr val="accent1"/>
-          </a:fillRef>
-          <a:effectRef idx="0">
-            <a:schemeClr val="accent1"/>
-          </a:effectRef>
-          <a:fontRef idx="minor">
-            <a:schemeClr val="tx1"/>
-          </a:fontRef>
-        </p:style>
-      </p:cxnSp>
-      <p:sp>
-        <p:nvSpPr>
-          <p:cNvPr id="22" name="Rectángulo 21"/>
-          <p:cNvSpPr/>
-          <p:nvPr/>
-        </p:nvSpPr>
-        <p:spPr>
-          <a:xfrm>
-            <a:off x="5732684" y="3710121"/>
-            <a:ext cx="1617073" cy="796834"/>
-          </a:xfrm>
-          <a:prstGeom prst="rect">
-            <a:avLst/>
-          </a:prstGeom>
-          <a:noFill/>
-          <a:ln>
-            <a:solidFill>
-              <a:schemeClr val="tx1"/>
-            </a:solidFill>
-          </a:ln>
-        </p:spPr>
-        <p:style>
-          <a:lnRef idx="2">
-            <a:schemeClr val="accent1">
-              <a:shade val="50000"/>
-            </a:schemeClr>
-          </a:lnRef>
-          <a:fillRef idx="1">
-            <a:schemeClr val="accent1"/>
-          </a:fillRef>
-          <a:effectRef idx="0">
-            <a:schemeClr val="accent1"/>
-          </a:effectRef>
-          <a:fontRef idx="minor">
-            <a:schemeClr val="lt1"/>
-          </a:fontRef>
-        </p:style>
-        <p:txBody>
-          <a:bodyPr rtlCol="0" anchor="ctr"/>
-          <a:lstStyle/>
-          <a:p>
-            <a:pPr algn="ctr"/>
-            <a:r>
-              <a:rPr lang="es-MX" dirty="0" smtClean="0">
-                <a:solidFill>
-                  <a:schemeClr val="tx1"/>
-                </a:solidFill>
-                <a:latin typeface="Arial" panose="020B0604020202020204" pitchFamily="34" charset="0"/>
-                <a:cs typeface="Arial" panose="020B0604020202020204" pitchFamily="34" charset="0"/>
-              </a:rPr>
-              <a:t>Calificar asignaciones</a:t>
-            </a:r>
-            <a:endParaRPr lang="fr-FR" dirty="0" smtClean="0">
-              <a:solidFill>
-                <a:schemeClr val="tx1"/>
-              </a:solidFill>
-              <a:latin typeface="Arial" panose="020B0604020202020204" pitchFamily="34" charset="0"/>
-              <a:cs typeface="Arial" panose="020B0604020202020204" pitchFamily="34" charset="0"/>
-            </a:endParaRPr>
-          </a:p>
-        </p:txBody>
-      </p:sp>
-      <p:sp>
-        <p:nvSpPr>
-          <p:cNvPr id="23" name="Decisión 22"/>
-          <p:cNvSpPr/>
-          <p:nvPr/>
-        </p:nvSpPr>
-        <p:spPr>
-          <a:xfrm>
-            <a:off x="5421219" y="4862633"/>
-            <a:ext cx="2246812" cy="1620889"/>
-          </a:xfrm>
-          <a:prstGeom prst="flowChartDecision">
-            <a:avLst/>
-          </a:prstGeom>
-          <a:noFill/>
-          <a:ln>
-            <a:solidFill>
-              <a:schemeClr val="tx1"/>
-            </a:solidFill>
-          </a:ln>
-        </p:spPr>
-        <p:style>
-          <a:lnRef idx="2">
-            <a:schemeClr val="accent1">
-              <a:shade val="50000"/>
-            </a:schemeClr>
-          </a:lnRef>
-          <a:fillRef idx="1">
-            <a:schemeClr val="accent1"/>
-          </a:fillRef>
-          <a:effectRef idx="0">
-            <a:schemeClr val="accent1"/>
-          </a:effectRef>
-          <a:fontRef idx="minor">
-            <a:schemeClr val="lt1"/>
-          </a:fontRef>
-        </p:style>
-        <p:txBody>
-          <a:bodyPr rtlCol="0" anchor="ctr"/>
-          <a:lstStyle/>
-          <a:p>
-            <a:pPr algn="ctr"/>
-            <a:r>
-              <a:rPr lang="fr-FR" dirty="0" smtClean="0">
-                <a:solidFill>
-                  <a:schemeClr val="tx1"/>
-                </a:solidFill>
-                <a:latin typeface="Arial" panose="020B0604020202020204" pitchFamily="34" charset="0"/>
-                <a:cs typeface="Arial" panose="020B0604020202020204" pitchFamily="34" charset="0"/>
-              </a:rPr>
-              <a:t>¿Se llegó al óptimo con AG?</a:t>
-            </a:r>
-            <a:endParaRPr lang="fr-FR" dirty="0">
-              <a:solidFill>
-                <a:schemeClr val="tx1"/>
-              </a:solidFill>
-              <a:latin typeface="Arial" panose="020B0604020202020204" pitchFamily="34" charset="0"/>
-              <a:cs typeface="Arial" panose="020B0604020202020204" pitchFamily="34" charset="0"/>
-            </a:endParaRPr>
-          </a:p>
-        </p:txBody>
-      </p:sp>
-      <p:cxnSp>
-        <p:nvCxnSpPr>
-          <p:cNvPr id="24" name="Conector recto de flecha 23"/>
-          <p:cNvCxnSpPr>
-            <a:stCxn id="22" idx="2"/>
-            <a:endCxn id="23" idx="0"/>
-          </p:cNvCxnSpPr>
-          <p:nvPr/>
-        </p:nvCxnSpPr>
-        <p:spPr>
-          <a:xfrm>
-            <a:off x="6541221" y="4506955"/>
-            <a:ext cx="3404" cy="355678"/>
+            <a:off x="2980272" y="5715000"/>
+            <a:ext cx="0" cy="201418"/>
           </a:xfrm>
           <a:prstGeom prst="straightConnector1">
             <a:avLst/>
@@ -4065,159 +4601,17 @@
       </p:cxnSp>
       <p:cxnSp>
         <p:nvCxnSpPr>
-          <p:cNvPr id="25" name="Conector angular 24"/>
+          <p:cNvPr id="88" name="Conector recto de flecha 87"/>
           <p:cNvCxnSpPr>
-            <a:stCxn id="23" idx="1"/>
-            <a:endCxn id="11" idx="1"/>
+            <a:stCxn id="4" idx="6"/>
+            <a:endCxn id="5" idx="1"/>
           </p:cNvCxnSpPr>
           <p:nvPr/>
         </p:nvCxnSpPr>
         <p:spPr>
-          <a:xfrm rot="10800000">
-            <a:off x="5197655" y="2881726"/>
-            <a:ext cx="223564" cy="2791352"/>
-          </a:xfrm>
-          <a:prstGeom prst="bentConnector3">
-            <a:avLst>
-              <a:gd name="adj1" fmla="val 202253"/>
-            </a:avLst>
-          </a:prstGeom>
-          <a:ln>
-            <a:solidFill>
-              <a:schemeClr val="tx1"/>
-            </a:solidFill>
-            <a:tailEnd type="triangle"/>
-          </a:ln>
-        </p:spPr>
-        <p:style>
-          <a:lnRef idx="1">
-            <a:schemeClr val="accent1"/>
-          </a:lnRef>
-          <a:fillRef idx="0">
-            <a:schemeClr val="accent1"/>
-          </a:fillRef>
-          <a:effectRef idx="0">
-            <a:schemeClr val="accent1"/>
-          </a:effectRef>
-          <a:fontRef idx="minor">
-            <a:schemeClr val="tx1"/>
-          </a:fontRef>
-        </p:style>
-      </p:cxnSp>
-      <p:sp>
-        <p:nvSpPr>
-          <p:cNvPr id="26" name="CuadroTexto 25"/>
-          <p:cNvSpPr txBox="1"/>
-          <p:nvPr/>
-        </p:nvSpPr>
-        <p:spPr>
           <a:xfrm>
-            <a:off x="4967150" y="5327685"/>
-            <a:ext cx="1051560" cy="369332"/>
-          </a:xfrm>
-          <a:prstGeom prst="rect">
-            <a:avLst/>
-          </a:prstGeom>
-          <a:noFill/>
-        </p:spPr>
-        <p:txBody>
-          <a:bodyPr wrap="square" rtlCol="0">
-            <a:spAutoFit/>
-          </a:bodyPr>
-          <a:lstStyle/>
-          <a:p>
-            <a:r>
-              <a:rPr lang="fr-FR" dirty="0" smtClean="0"/>
-              <a:t>No</a:t>
-            </a:r>
-            <a:endParaRPr lang="fr-FR" dirty="0"/>
-          </a:p>
-        </p:txBody>
-      </p:sp>
-      <p:sp>
-        <p:nvSpPr>
-          <p:cNvPr id="27" name="CuadroTexto 26"/>
-          <p:cNvSpPr txBox="1"/>
-          <p:nvPr/>
-        </p:nvSpPr>
-        <p:spPr>
-          <a:xfrm>
-            <a:off x="7755389" y="5327685"/>
-            <a:ext cx="388620" cy="369332"/>
-          </a:xfrm>
-          <a:prstGeom prst="rect">
-            <a:avLst/>
-          </a:prstGeom>
-          <a:noFill/>
-        </p:spPr>
-        <p:txBody>
-          <a:bodyPr wrap="square" rtlCol="0">
-            <a:spAutoFit/>
-          </a:bodyPr>
-          <a:lstStyle/>
-          <a:p>
-            <a:r>
-              <a:rPr lang="fr-FR" dirty="0" smtClean="0"/>
-              <a:t>Si</a:t>
-            </a:r>
-            <a:endParaRPr lang="fr-FR" dirty="0"/>
-          </a:p>
-        </p:txBody>
-      </p:sp>
-      <p:cxnSp>
-        <p:nvCxnSpPr>
-          <p:cNvPr id="28" name="Conector angular 27"/>
-          <p:cNvCxnSpPr>
-            <a:stCxn id="23" idx="3"/>
-            <a:endCxn id="30" idx="1"/>
-          </p:cNvCxnSpPr>
-          <p:nvPr/>
-        </p:nvCxnSpPr>
-        <p:spPr>
-          <a:xfrm flipV="1">
-            <a:off x="7668031" y="4714493"/>
-            <a:ext cx="1120002" cy="958585"/>
-          </a:xfrm>
-          <a:prstGeom prst="bentConnector3">
-            <a:avLst>
-              <a:gd name="adj1" fmla="val 50000"/>
-            </a:avLst>
-          </a:prstGeom>
-          <a:ln>
-            <a:solidFill>
-              <a:schemeClr val="tx1"/>
-            </a:solidFill>
-            <a:tailEnd type="triangle"/>
-          </a:ln>
-        </p:spPr>
-        <p:style>
-          <a:lnRef idx="1">
-            <a:schemeClr val="accent1"/>
-          </a:lnRef>
-          <a:fillRef idx="0">
-            <a:schemeClr val="accent1"/>
-          </a:fillRef>
-          <a:effectRef idx="0">
-            <a:schemeClr val="accent1"/>
-          </a:effectRef>
-          <a:fontRef idx="minor">
-            <a:schemeClr val="tx1"/>
-          </a:fontRef>
-        </p:style>
-      </p:cxnSp>
-      <p:cxnSp>
-        <p:nvCxnSpPr>
-          <p:cNvPr id="29" name="Conector recto de flecha 28"/>
-          <p:cNvCxnSpPr>
-            <a:stCxn id="11" idx="2"/>
-            <a:endCxn id="22" idx="0"/>
-          </p:cNvCxnSpPr>
-          <p:nvPr/>
-        </p:nvCxnSpPr>
-        <p:spPr>
-          <a:xfrm flipH="1">
-            <a:off x="6541221" y="3312259"/>
-            <a:ext cx="3269" cy="397862"/>
+            <a:off x="1384663" y="464172"/>
+            <a:ext cx="400359" cy="0"/>
           </a:xfrm>
           <a:prstGeom prst="straightConnector1">
             <a:avLst/>
@@ -4244,172 +4638,141 @@
           </a:fontRef>
         </p:style>
       </p:cxnSp>
-      <p:sp>
-        <p:nvSpPr>
-          <p:cNvPr id="30" name="Documento 29"/>
-          <p:cNvSpPr/>
+      <p:cxnSp>
+        <p:nvCxnSpPr>
+          <p:cNvPr id="97" name="Conector angular 96"/>
+          <p:cNvCxnSpPr>
+            <a:stCxn id="13" idx="3"/>
+            <a:endCxn id="15" idx="1"/>
+          </p:cNvCxnSpPr>
           <p:nvPr/>
-        </p:nvSpPr>
-        <p:spPr>
-          <a:xfrm>
-            <a:off x="8788033" y="3999849"/>
-            <a:ext cx="2930711" cy="1429288"/>
-          </a:xfrm>
-          <a:prstGeom prst="flowChartDocument">
-            <a:avLst/>
+        </p:nvCxnSpPr>
+        <p:spPr>
+          <a:xfrm flipV="1">
+            <a:off x="4175523" y="1403052"/>
+            <a:ext cx="801644" cy="4911783"/>
+          </a:xfrm>
+          <a:prstGeom prst="bentConnector3">
+            <a:avLst>
+              <a:gd name="adj1" fmla="val 74887"/>
+            </a:avLst>
           </a:prstGeom>
-          <a:noFill/>
           <a:ln>
             <a:solidFill>
               <a:schemeClr val="tx1"/>
             </a:solidFill>
+            <a:tailEnd type="triangle"/>
           </a:ln>
         </p:spPr>
         <p:style>
-          <a:lnRef idx="2">
-            <a:schemeClr val="accent1">
-              <a:shade val="50000"/>
-            </a:schemeClr>
+          <a:lnRef idx="1">
+            <a:schemeClr val="accent1"/>
           </a:lnRef>
-          <a:fillRef idx="1">
+          <a:fillRef idx="0">
             <a:schemeClr val="accent1"/>
           </a:fillRef>
           <a:effectRef idx="0">
             <a:schemeClr val="accent1"/>
           </a:effectRef>
           <a:fontRef idx="minor">
-            <a:schemeClr val="lt1"/>
+            <a:schemeClr val="tx1"/>
           </a:fontRef>
         </p:style>
-        <p:txBody>
-          <a:bodyPr rtlCol="0" anchor="ctr"/>
-          <a:lstStyle/>
-          <a:p>
-            <a:pPr algn="ctr"/>
-            <a:r>
-              <a:rPr lang="es-MX" dirty="0">
-                <a:solidFill>
-                  <a:schemeClr val="tx1"/>
-                </a:solidFill>
-                <a:latin typeface="Arial" panose="020B0604020202020204" pitchFamily="34" charset="0"/>
-                <a:cs typeface="Arial" panose="020B0604020202020204" pitchFamily="34" charset="0"/>
-              </a:rPr>
-              <a:t>Matriz de 4 columnas con la asignación de materia, horario,</a:t>
-            </a:r>
-            <a:r>
-              <a:rPr lang="es-MX" dirty="0" smtClean="0">
-                <a:solidFill>
-                  <a:schemeClr val="tx1"/>
-                </a:solidFill>
-                <a:latin typeface="Arial" panose="020B0604020202020204" pitchFamily="34" charset="0"/>
-                <a:cs typeface="Arial" panose="020B0604020202020204" pitchFamily="34" charset="0"/>
-              </a:rPr>
-              <a:t/>
-            </a:r>
-            <a:br>
-              <a:rPr lang="es-MX" dirty="0" smtClean="0">
-                <a:solidFill>
-                  <a:schemeClr val="tx1"/>
-                </a:solidFill>
-                <a:latin typeface="Arial" panose="020B0604020202020204" pitchFamily="34" charset="0"/>
-                <a:cs typeface="Arial" panose="020B0604020202020204" pitchFamily="34" charset="0"/>
-              </a:rPr>
-            </a:br>
-            <a:r>
-              <a:rPr lang="es-MX" dirty="0">
-                <a:solidFill>
-                  <a:schemeClr val="tx1"/>
-                </a:solidFill>
-                <a:latin typeface="Arial" panose="020B0604020202020204" pitchFamily="34" charset="0"/>
-                <a:cs typeface="Arial" panose="020B0604020202020204" pitchFamily="34" charset="0"/>
-              </a:rPr>
-              <a:t>profesor, (salón).</a:t>
-            </a:r>
-            <a:endParaRPr lang="fr-FR" dirty="0">
-              <a:solidFill>
-                <a:schemeClr val="tx1"/>
-              </a:solidFill>
-              <a:latin typeface="Arial" panose="020B0604020202020204" pitchFamily="34" charset="0"/>
-              <a:cs typeface="Arial" panose="020B0604020202020204" pitchFamily="34" charset="0"/>
-            </a:endParaRPr>
-          </a:p>
-        </p:txBody>
-      </p:sp>
-      <p:sp>
-        <p:nvSpPr>
-          <p:cNvPr id="31" name="Elipse 30"/>
-          <p:cNvSpPr/>
+      </p:cxnSp>
+      <p:cxnSp>
+        <p:nvCxnSpPr>
+          <p:cNvPr id="121" name="Conector recto de flecha 120"/>
+          <p:cNvCxnSpPr>
+            <a:stCxn id="15" idx="2"/>
+            <a:endCxn id="20" idx="0"/>
+          </p:cNvCxnSpPr>
           <p:nvPr/>
-        </p:nvSpPr>
+        </p:nvCxnSpPr>
         <p:spPr>
           <a:xfrm>
-            <a:off x="9561057" y="5648045"/>
-            <a:ext cx="1384663" cy="470261"/>
-          </a:xfrm>
-          <a:prstGeom prst="ellipse">
+            <a:off x="6880287" y="2341932"/>
+            <a:ext cx="12835" cy="391952"/>
+          </a:xfrm>
+          <a:prstGeom prst="straightConnector1">
             <a:avLst/>
           </a:prstGeom>
-          <a:noFill/>
           <a:ln>
             <a:solidFill>
               <a:schemeClr val="tx1"/>
             </a:solidFill>
+            <a:tailEnd type="triangle"/>
           </a:ln>
         </p:spPr>
         <p:style>
-          <a:lnRef idx="2">
-            <a:schemeClr val="accent1">
-              <a:shade val="50000"/>
-            </a:schemeClr>
+          <a:lnRef idx="1">
+            <a:schemeClr val="accent1"/>
           </a:lnRef>
-          <a:fillRef idx="1">
+          <a:fillRef idx="0">
             <a:schemeClr val="accent1"/>
           </a:fillRef>
           <a:effectRef idx="0">
             <a:schemeClr val="accent1"/>
           </a:effectRef>
           <a:fontRef idx="minor">
-            <a:schemeClr val="lt1"/>
+            <a:schemeClr val="tx1"/>
           </a:fontRef>
         </p:style>
-        <p:txBody>
-          <a:bodyPr rtlCol="0" anchor="ctr"/>
-          <a:lstStyle/>
-          <a:p>
-            <a:pPr algn="ctr"/>
-            <a:r>
-              <a:rPr lang="fr-FR" dirty="0" smtClean="0">
-                <a:solidFill>
-                  <a:schemeClr val="tx1"/>
-                </a:solidFill>
-                <a:latin typeface="Arial" panose="020B0604020202020204" pitchFamily="34" charset="0"/>
-                <a:cs typeface="Arial" panose="020B0604020202020204" pitchFamily="34" charset="0"/>
-              </a:rPr>
-              <a:t>Fin</a:t>
-            </a:r>
-            <a:endParaRPr lang="fr-FR" dirty="0">
-              <a:solidFill>
-                <a:schemeClr val="tx1"/>
-              </a:solidFill>
-              <a:latin typeface="Arial" panose="020B0604020202020204" pitchFamily="34" charset="0"/>
-              <a:cs typeface="Arial" panose="020B0604020202020204" pitchFamily="34" charset="0"/>
-            </a:endParaRPr>
-          </a:p>
-        </p:txBody>
-      </p:sp>
+      </p:cxnSp>
       <p:cxnSp>
         <p:nvCxnSpPr>
-          <p:cNvPr id="32" name="Conector recto de flecha 31"/>
+          <p:cNvPr id="138" name="Conector angular 137"/>
           <p:cNvCxnSpPr>
-            <a:stCxn id="30" idx="2"/>
-            <a:endCxn id="31" idx="0"/>
+            <a:stCxn id="22" idx="2"/>
+            <a:endCxn id="23" idx="1"/>
           </p:cNvCxnSpPr>
           <p:nvPr/>
         </p:nvCxnSpPr>
         <p:spPr>
+          <a:xfrm rot="5400000" flipH="1" flipV="1">
+            <a:off x="6356765" y="2493991"/>
+            <a:ext cx="3841450" cy="2801986"/>
+          </a:xfrm>
+          <a:prstGeom prst="bentConnector4">
+            <a:avLst>
+              <a:gd name="adj1" fmla="val -5951"/>
+              <a:gd name="adj2" fmla="val 86975"/>
+            </a:avLst>
+          </a:prstGeom>
+          <a:ln>
+            <a:solidFill>
+              <a:schemeClr val="tx1"/>
+            </a:solidFill>
+            <a:tailEnd type="triangle"/>
+          </a:ln>
+        </p:spPr>
+        <p:style>
+          <a:lnRef idx="1">
+            <a:schemeClr val="accent1"/>
+          </a:lnRef>
+          <a:fillRef idx="0">
+            <a:schemeClr val="accent1"/>
+          </a:fillRef>
+          <a:effectRef idx="0">
+            <a:schemeClr val="accent1"/>
+          </a:effectRef>
+          <a:fontRef idx="minor">
+            <a:schemeClr val="tx1"/>
+          </a:fontRef>
+        </p:style>
+      </p:cxnSp>
+      <p:cxnSp>
+        <p:nvCxnSpPr>
+          <p:cNvPr id="164" name="Conector recto de flecha 163"/>
+          <p:cNvCxnSpPr>
+            <a:stCxn id="23" idx="2"/>
+            <a:endCxn id="30" idx="0"/>
+          </p:cNvCxnSpPr>
+          <p:nvPr/>
+        </p:nvCxnSpPr>
+        <p:spPr>
           <a:xfrm>
-            <a:off x="10253389" y="5334645"/>
-            <a:ext cx="0" cy="313400"/>
+            <a:off x="10801889" y="2784703"/>
+            <a:ext cx="13181" cy="488494"/>
           </a:xfrm>
           <a:prstGeom prst="straightConnector1">
             <a:avLst/>
@@ -4446,6 +4809,13 @@
   <p:clrMapOvr>
     <a:masterClrMapping/>
   </p:clrMapOvr>
+  <p:timing>
+    <p:tnLst>
+      <p:par>
+        <p:cTn id="1" dur="indefinite" restart="never" nodeType="tmRoot"/>
+      </p:par>
+    </p:tnLst>
+  </p:timing>
 </p:sld>
 </file>
 

</xml_diff>